<commit_message>
Timeline icons function with timeline filter, including fieldtrips. Also updated indices icon.
Need to resize or reposition icons.

Close #40 and Close #19

Signed-off-by: dhuangg <danielhuang@g.ucla.edu>
</commit_message>
<xml_diff>
--- a/Documentation/Danish Folklore Nexus Documentation_4.7.18.pptx
+++ b/Documentation/Danish Folklore Nexus Documentation_4.7.18.pptx
@@ -5288,7 +5288,7 @@
           <a:p>
             <a:fld id="{4F6AB58B-9030-734F-AF14-19956B41A199}" type="datetimeFigureOut">
               <a:rPr lang="en-US" smtClean="0"/>
-              <a:t>3/23/18</a:t>
+              <a:t>10/8/18</a:t>
             </a:fld>
             <a:endParaRPr lang="en-US"/>
           </a:p>
@@ -6485,7 +6485,7 @@
           <a:p>
             <a:fld id="{DF92B19E-8775-4A48-937A-7C6D2A4C7708}" type="datetimeFigureOut">
               <a:rPr lang="en-US" smtClean="0"/>
-              <a:t>3/19/18</a:t>
+              <a:t>10/8/18</a:t>
             </a:fld>
             <a:endParaRPr lang="en-US"/>
           </a:p>
@@ -6655,7 +6655,7 @@
           <a:p>
             <a:fld id="{DF92B19E-8775-4A48-937A-7C6D2A4C7708}" type="datetimeFigureOut">
               <a:rPr lang="en-US" smtClean="0"/>
-              <a:t>3/19/18</a:t>
+              <a:t>10/8/18</a:t>
             </a:fld>
             <a:endParaRPr lang="en-US"/>
           </a:p>
@@ -6835,7 +6835,7 @@
           <a:p>
             <a:fld id="{DF92B19E-8775-4A48-937A-7C6D2A4C7708}" type="datetimeFigureOut">
               <a:rPr lang="en-US" smtClean="0"/>
-              <a:t>3/19/18</a:t>
+              <a:t>10/8/18</a:t>
             </a:fld>
             <a:endParaRPr lang="en-US"/>
           </a:p>
@@ -7010,7 +7010,7 @@
           <a:p>
             <a:fld id="{DF92B19E-8775-4A48-937A-7C6D2A4C7708}" type="datetimeFigureOut">
               <a:rPr lang="en-US" smtClean="0"/>
-              <a:t>3/19/18</a:t>
+              <a:t>10/8/18</a:t>
             </a:fld>
             <a:endParaRPr lang="en-US"/>
           </a:p>
@@ -7268,7 +7268,7 @@
           <a:p>
             <a:fld id="{DF92B19E-8775-4A48-937A-7C6D2A4C7708}" type="datetimeFigureOut">
               <a:rPr lang="en-US" smtClean="0"/>
-              <a:t>3/19/18</a:t>
+              <a:t>10/8/18</a:t>
             </a:fld>
             <a:endParaRPr lang="en-US"/>
           </a:p>
@@ -7556,7 +7556,7 @@
           <a:p>
             <a:fld id="{DF92B19E-8775-4A48-937A-7C6D2A4C7708}" type="datetimeFigureOut">
               <a:rPr lang="en-US" smtClean="0"/>
-              <a:t>3/19/18</a:t>
+              <a:t>10/8/18</a:t>
             </a:fld>
             <a:endParaRPr lang="en-US"/>
           </a:p>
@@ -7998,7 +7998,7 @@
           <a:p>
             <a:fld id="{DF92B19E-8775-4A48-937A-7C6D2A4C7708}" type="datetimeFigureOut">
               <a:rPr lang="en-US" smtClean="0"/>
-              <a:t>3/19/18</a:t>
+              <a:t>10/8/18</a:t>
             </a:fld>
             <a:endParaRPr lang="en-US"/>
           </a:p>
@@ -8116,7 +8116,7 @@
           <a:p>
             <a:fld id="{DF92B19E-8775-4A48-937A-7C6D2A4C7708}" type="datetimeFigureOut">
               <a:rPr lang="en-US" smtClean="0"/>
-              <a:t>3/19/18</a:t>
+              <a:t>10/8/18</a:t>
             </a:fld>
             <a:endParaRPr lang="en-US"/>
           </a:p>
@@ -8211,7 +8211,7 @@
           <a:p>
             <a:fld id="{DF92B19E-8775-4A48-937A-7C6D2A4C7708}" type="datetimeFigureOut">
               <a:rPr lang="en-US" smtClean="0"/>
-              <a:t>3/19/18</a:t>
+              <a:t>10/8/18</a:t>
             </a:fld>
             <a:endParaRPr lang="en-US"/>
           </a:p>
@@ -8499,7 +8499,7 @@
           <a:p>
             <a:fld id="{DF92B19E-8775-4A48-937A-7C6D2A4C7708}" type="datetimeFigureOut">
               <a:rPr lang="en-US" smtClean="0"/>
-              <a:t>3/19/18</a:t>
+              <a:t>10/8/18</a:t>
             </a:fld>
             <a:endParaRPr lang="en-US"/>
           </a:p>
@@ -8772,7 +8772,7 @@
           <a:p>
             <a:fld id="{DF92B19E-8775-4A48-937A-7C6D2A4C7708}" type="datetimeFigureOut">
               <a:rPr lang="en-US" smtClean="0"/>
-              <a:t>3/19/18</a:t>
+              <a:t>10/8/18</a:t>
             </a:fld>
             <a:endParaRPr lang="en-US"/>
           </a:p>
@@ -9069,7 +9069,7 @@
           <a:p>
             <a:fld id="{DF92B19E-8775-4A48-937A-7C6D2A4C7708}" type="datetimeFigureOut">
               <a:rPr lang="en-US" smtClean="0"/>
-              <a:t>3/19/18</a:t>
+              <a:t>10/8/18</a:t>
             </a:fld>
             <a:endParaRPr lang="en-US"/>
           </a:p>

</xml_diff>

<commit_message>
Preparing for merge with master
</commit_message>
<xml_diff>
--- a/Documentation/Danish Folklore Nexus Documentation_4.7.18.pptx
+++ b/Documentation/Danish Folklore Nexus Documentation_4.7.18.pptx
@@ -5288,7 +5288,7 @@
           <a:p>
             <a:fld id="{4F6AB58B-9030-734F-AF14-19956B41A199}" type="datetimeFigureOut">
               <a:rPr lang="en-US" smtClean="0"/>
-              <a:t>3/23/18</a:t>
+              <a:t>10/8/18</a:t>
             </a:fld>
             <a:endParaRPr lang="en-US"/>
           </a:p>
@@ -6485,7 +6485,7 @@
           <a:p>
             <a:fld id="{DF92B19E-8775-4A48-937A-7C6D2A4C7708}" type="datetimeFigureOut">
               <a:rPr lang="en-US" smtClean="0"/>
-              <a:t>3/19/18</a:t>
+              <a:t>10/8/18</a:t>
             </a:fld>
             <a:endParaRPr lang="en-US"/>
           </a:p>
@@ -6655,7 +6655,7 @@
           <a:p>
             <a:fld id="{DF92B19E-8775-4A48-937A-7C6D2A4C7708}" type="datetimeFigureOut">
               <a:rPr lang="en-US" smtClean="0"/>
-              <a:t>3/19/18</a:t>
+              <a:t>10/8/18</a:t>
             </a:fld>
             <a:endParaRPr lang="en-US"/>
           </a:p>
@@ -6835,7 +6835,7 @@
           <a:p>
             <a:fld id="{DF92B19E-8775-4A48-937A-7C6D2A4C7708}" type="datetimeFigureOut">
               <a:rPr lang="en-US" smtClean="0"/>
-              <a:t>3/19/18</a:t>
+              <a:t>10/8/18</a:t>
             </a:fld>
             <a:endParaRPr lang="en-US"/>
           </a:p>
@@ -7010,7 +7010,7 @@
           <a:p>
             <a:fld id="{DF92B19E-8775-4A48-937A-7C6D2A4C7708}" type="datetimeFigureOut">
               <a:rPr lang="en-US" smtClean="0"/>
-              <a:t>3/19/18</a:t>
+              <a:t>10/8/18</a:t>
             </a:fld>
             <a:endParaRPr lang="en-US"/>
           </a:p>
@@ -7268,7 +7268,7 @@
           <a:p>
             <a:fld id="{DF92B19E-8775-4A48-937A-7C6D2A4C7708}" type="datetimeFigureOut">
               <a:rPr lang="en-US" smtClean="0"/>
-              <a:t>3/19/18</a:t>
+              <a:t>10/8/18</a:t>
             </a:fld>
             <a:endParaRPr lang="en-US"/>
           </a:p>
@@ -7556,7 +7556,7 @@
           <a:p>
             <a:fld id="{DF92B19E-8775-4A48-937A-7C6D2A4C7708}" type="datetimeFigureOut">
               <a:rPr lang="en-US" smtClean="0"/>
-              <a:t>3/19/18</a:t>
+              <a:t>10/8/18</a:t>
             </a:fld>
             <a:endParaRPr lang="en-US"/>
           </a:p>
@@ -7998,7 +7998,7 @@
           <a:p>
             <a:fld id="{DF92B19E-8775-4A48-937A-7C6D2A4C7708}" type="datetimeFigureOut">
               <a:rPr lang="en-US" smtClean="0"/>
-              <a:t>3/19/18</a:t>
+              <a:t>10/8/18</a:t>
             </a:fld>
             <a:endParaRPr lang="en-US"/>
           </a:p>
@@ -8116,7 +8116,7 @@
           <a:p>
             <a:fld id="{DF92B19E-8775-4A48-937A-7C6D2A4C7708}" type="datetimeFigureOut">
               <a:rPr lang="en-US" smtClean="0"/>
-              <a:t>3/19/18</a:t>
+              <a:t>10/8/18</a:t>
             </a:fld>
             <a:endParaRPr lang="en-US"/>
           </a:p>
@@ -8211,7 +8211,7 @@
           <a:p>
             <a:fld id="{DF92B19E-8775-4A48-937A-7C6D2A4C7708}" type="datetimeFigureOut">
               <a:rPr lang="en-US" smtClean="0"/>
-              <a:t>3/19/18</a:t>
+              <a:t>10/8/18</a:t>
             </a:fld>
             <a:endParaRPr lang="en-US"/>
           </a:p>
@@ -8499,7 +8499,7 @@
           <a:p>
             <a:fld id="{DF92B19E-8775-4A48-937A-7C6D2A4C7708}" type="datetimeFigureOut">
               <a:rPr lang="en-US" smtClean="0"/>
-              <a:t>3/19/18</a:t>
+              <a:t>10/8/18</a:t>
             </a:fld>
             <a:endParaRPr lang="en-US"/>
           </a:p>
@@ -8772,7 +8772,7 @@
           <a:p>
             <a:fld id="{DF92B19E-8775-4A48-937A-7C6D2A4C7708}" type="datetimeFigureOut">
               <a:rPr lang="en-US" smtClean="0"/>
-              <a:t>3/19/18</a:t>
+              <a:t>10/8/18</a:t>
             </a:fld>
             <a:endParaRPr lang="en-US"/>
           </a:p>
@@ -9069,7 +9069,7 @@
           <a:p>
             <a:fld id="{DF92B19E-8775-4A48-937A-7C6D2A4C7708}" type="datetimeFigureOut">
               <a:rPr lang="en-US" smtClean="0"/>
-              <a:t>3/19/18</a:t>
+              <a:t>10/8/18</a:t>
             </a:fld>
             <a:endParaRPr lang="en-US"/>
           </a:p>

</xml_diff>